<commit_message>
Updated version of the JORNI idea
Updated version of the JORNI idea
</commit_message>
<xml_diff>
--- a/idea/JORNI_PLEDGE_TO_PROGRES_Microsoft_Sustainability.pptx
+++ b/idea/JORNI_PLEDGE_TO_PROGRES_Microsoft_Sustainability.pptx
@@ -35059,8 +35059,70 @@
                 <a:cs typeface="Lato" panose="020F0502020204030203"/>
                 <a:sym typeface="Lato" panose="020F0502020204030203"/>
               </a:rPr>
-              <a:t>This app can be used by all segments Children, Adults and trainer who have a seperate portal to be a part of their training and programs and AI to support both the user and trainers</a:t>
+              <a:t>This app can be used by all segments Children, Adults and trainer who have a seperate portal to be a part of their training and programs and AI to support both the user and trainers. Our app addresses the below given areas which most of them want to achieve</a:t>
             </a:r>
+            <a:endParaRPr lang="en-MY" sz="1400" b="0" i="0" u="none" strike="noStrike" cap="none">
+              <a:solidFill>
+                <a:srgbClr val="222222"/>
+              </a:solidFill>
+              <a:highlight>
+                <a:srgbClr val="FFFFFF"/>
+              </a:highlight>
+              <a:latin typeface="Lato" panose="020F0502020204030203"/>
+              <a:ea typeface="Lato" panose="020F0502020204030203"/>
+              <a:cs typeface="Lato" panose="020F0502020204030203"/>
+              <a:sym typeface="Lato" panose="020F0502020204030203"/>
+            </a:endParaRPr>
+          </a:p>
+          <a:p>
+            <a:pPr marL="0" marR="0" lvl="0" indent="0" algn="l" rtl="0">
+              <a:lnSpc>
+                <a:spcPct val="115000"/>
+              </a:lnSpc>
+              <a:spcBef>
+                <a:spcPts val="1000"/>
+              </a:spcBef>
+              <a:spcAft>
+                <a:spcPts val="0"/>
+              </a:spcAft>
+              <a:buClr>
+                <a:srgbClr val="000000"/>
+              </a:buClr>
+              <a:buSzPts val="1400"/>
+              <a:buFont typeface="Arial" panose="020B0604020202020204"/>
+              <a:buNone/>
+            </a:pPr>
+            <a:endParaRPr lang="en-MY" sz="1400" b="0" i="0" u="none" strike="noStrike" cap="none">
+              <a:solidFill>
+                <a:srgbClr val="222222"/>
+              </a:solidFill>
+              <a:highlight>
+                <a:srgbClr val="FFFFFF"/>
+              </a:highlight>
+              <a:latin typeface="Lato" panose="020F0502020204030203"/>
+              <a:ea typeface="Lato" panose="020F0502020204030203"/>
+              <a:cs typeface="Lato" panose="020F0502020204030203"/>
+              <a:sym typeface="Lato" panose="020F0502020204030203"/>
+            </a:endParaRPr>
+          </a:p>
+          <a:p>
+            <a:pPr marL="0" marR="0" lvl="0" indent="0" algn="l" rtl="0">
+              <a:lnSpc>
+                <a:spcPct val="115000"/>
+              </a:lnSpc>
+              <a:spcBef>
+                <a:spcPts val="1000"/>
+              </a:spcBef>
+              <a:spcAft>
+                <a:spcPts val="0"/>
+              </a:spcAft>
+              <a:buClr>
+                <a:srgbClr val="000000"/>
+              </a:buClr>
+              <a:buSzPts val="1400"/>
+              <a:buFont typeface="Arial" panose="020B0604020202020204"/>
+              <a:buNone/>
+            </a:pPr>
             <a:endParaRPr sz="1400" b="0" i="0" u="none" strike="noStrike" cap="none">
               <a:solidFill>
                 <a:srgbClr val="222222"/>
@@ -35128,11 +35190,174 @@
           </a:prstGeom>
         </p:spPr>
       </p:pic>
+      <p:sp>
+        <p:nvSpPr>
+          <p:cNvPr id="4" name="Text Box 3"/>
+          <p:cNvSpPr txBox="1"/>
+          <p:nvPr/>
+        </p:nvSpPr>
+        <p:spPr>
+          <a:xfrm>
+            <a:off x="4259580" y="2341245"/>
+            <a:ext cx="750570" cy="306705"/>
+          </a:xfrm>
+          <a:prstGeom prst="rect">
+            <a:avLst/>
+          </a:prstGeom>
+          <a:noFill/>
+        </p:spPr>
+        <p:txBody>
+          <a:bodyPr wrap="square" rtlCol="0">
+            <a:spAutoFit/>
+          </a:bodyPr>
+          <a:p>
+            <a:r>
+              <a:rPr lang="en-MY" altLang="en-US"/>
+              <a:t>Simple</a:t>
+            </a:r>
+            <a:endParaRPr lang="en-MY" altLang="en-US"/>
+          </a:p>
+        </p:txBody>
+      </p:sp>
+      <p:sp>
+        <p:nvSpPr>
+          <p:cNvPr id="5" name="Quad Arrow Callout 4"/>
+          <p:cNvSpPr/>
+          <p:nvPr/>
+        </p:nvSpPr>
+        <p:spPr>
+          <a:xfrm>
+            <a:off x="3606165" y="2647950"/>
+            <a:ext cx="2057400" cy="1752600"/>
+          </a:xfrm>
+          <a:prstGeom prst="quadArrowCallout">
+            <a:avLst/>
+          </a:prstGeom>
+        </p:spPr>
+        <p:style>
+          <a:lnRef idx="2">
+            <a:schemeClr val="accent1">
+              <a:shade val="50000"/>
+            </a:schemeClr>
+          </a:lnRef>
+          <a:fillRef idx="1">
+            <a:schemeClr val="accent1"/>
+          </a:fillRef>
+          <a:effectRef idx="0">
+            <a:schemeClr val="accent1"/>
+          </a:effectRef>
+          <a:fontRef idx="minor">
+            <a:schemeClr val="lt1"/>
+          </a:fontRef>
+        </p:style>
+        <p:txBody>
+          <a:bodyPr rtlCol="0" anchor="ctr"/>
+          <a:p>
+            <a:pPr algn="ctr"/>
+            <a:endParaRPr lang="en-US"/>
+          </a:p>
+        </p:txBody>
+      </p:sp>
+      <p:sp>
+        <p:nvSpPr>
+          <p:cNvPr id="7" name="Text Box 6"/>
+          <p:cNvSpPr txBox="1"/>
+          <p:nvPr/>
+        </p:nvSpPr>
+        <p:spPr>
+          <a:xfrm rot="5400000">
+            <a:off x="5441315" y="3326765"/>
+            <a:ext cx="750570" cy="306705"/>
+          </a:xfrm>
+          <a:prstGeom prst="rect">
+            <a:avLst/>
+          </a:prstGeom>
+          <a:noFill/>
+        </p:spPr>
+        <p:txBody>
+          <a:bodyPr wrap="square" rtlCol="0">
+            <a:spAutoFit/>
+          </a:bodyPr>
+          <a:p>
+            <a:r>
+              <a:rPr lang="en-MY" altLang="en-US"/>
+              <a:t>Useful</a:t>
+            </a:r>
+            <a:endParaRPr lang="en-MY" altLang="en-US"/>
+          </a:p>
+        </p:txBody>
+      </p:sp>
+      <p:sp>
+        <p:nvSpPr>
+          <p:cNvPr id="8" name="Text Box 7"/>
+          <p:cNvSpPr txBox="1"/>
+          <p:nvPr/>
+        </p:nvSpPr>
+        <p:spPr>
+          <a:xfrm>
+            <a:off x="3862705" y="4400550"/>
+            <a:ext cx="1537970" cy="306705"/>
+          </a:xfrm>
+          <a:prstGeom prst="rect">
+            <a:avLst/>
+          </a:prstGeom>
+          <a:noFill/>
+        </p:spPr>
+        <p:txBody>
+          <a:bodyPr wrap="square" rtlCol="0">
+            <a:spAutoFit/>
+          </a:bodyPr>
+          <a:p>
+            <a:r>
+              <a:rPr lang="en-MY" altLang="en-US"/>
+              <a:t>AutomatedGuide</a:t>
+            </a:r>
+            <a:endParaRPr lang="en-MY" altLang="en-US"/>
+          </a:p>
+        </p:txBody>
+      </p:sp>
+      <p:sp>
+        <p:nvSpPr>
+          <p:cNvPr id="9" name="Text Box 8"/>
+          <p:cNvSpPr txBox="1"/>
+          <p:nvPr/>
+        </p:nvSpPr>
+        <p:spPr>
+          <a:xfrm rot="16200000">
+            <a:off x="2834005" y="3326765"/>
+            <a:ext cx="1191260" cy="306705"/>
+          </a:xfrm>
+          <a:prstGeom prst="rect">
+            <a:avLst/>
+          </a:prstGeom>
+          <a:noFill/>
+        </p:spPr>
+        <p:txBody>
+          <a:bodyPr wrap="square" rtlCol="0">
+            <a:spAutoFit/>
+          </a:bodyPr>
+          <a:p>
+            <a:r>
+              <a:rPr lang="en-MY" altLang="en-US"/>
+              <a:t>Sustainable</a:t>
+            </a:r>
+            <a:endParaRPr lang="en-MY" altLang="en-US"/>
+          </a:p>
+        </p:txBody>
+      </p:sp>
     </p:spTree>
   </p:cSld>
   <p:clrMapOvr>
     <a:masterClrMapping/>
   </p:clrMapOvr>
+  <mc:AlternateContent xmlns:mc="http://schemas.openxmlformats.org/markup-compatibility/2006">
+    <mc:Choice xmlns:p14="http://schemas.microsoft.com/office/powerpoint/2010/main" Requires="p14">
+      <p:transition spd="slow" p14:dur="1250"/>
+    </mc:Choice>
+    <mc:Fallback>
+      <p:transition spd="slow"/>
+    </mc:Fallback>
+  </mc:AlternateContent>
 </p:sld>
 </file>
 
@@ -35208,7 +35433,191 @@
                 <a:cs typeface="Lato" panose="020F0502020204030203"/>
                 <a:sym typeface="Lato" panose="020F0502020204030203"/>
               </a:rPr>
-              <a:t>There are lot of spritual apps, but JORNI is not a training, yoga or fitness app. It goes beyound just training, its a lifestyle app and strong AI provides continues stickey of the users. JORNi will be a well crafted app which will help users avoid excessive use to gadgets and be more interactive  </a:t>
+              <a:t>There are lot of spritual apps, but JORNI is not a training, yoga or fitness app. It goes beyound just training, its a green lifestyle app and strong AI provides continues stickiness for the users. JORNi will be a well crafted app which will help users avoid excessive use to gadgets and be more interactive. Pre-Requisits include.</a:t>
+            </a:r>
+            <a:endParaRPr lang="en-MY" altLang="en-GB" sz="1400" b="0" i="0" u="none" strike="noStrike" cap="none">
+              <a:solidFill>
+                <a:srgbClr val="222222"/>
+              </a:solidFill>
+              <a:highlight>
+                <a:srgbClr val="FFFFFF"/>
+              </a:highlight>
+              <a:latin typeface="Lato" panose="020F0502020204030203"/>
+              <a:ea typeface="Lato" panose="020F0502020204030203"/>
+              <a:cs typeface="Lato" panose="020F0502020204030203"/>
+              <a:sym typeface="Lato" panose="020F0502020204030203"/>
+            </a:endParaRPr>
+          </a:p>
+          <a:p>
+            <a:pPr marL="0" marR="0" lvl="0" indent="0" algn="l" rtl="0">
+              <a:lnSpc>
+                <a:spcPct val="115000"/>
+              </a:lnSpc>
+              <a:spcBef>
+                <a:spcPts val="1000"/>
+              </a:spcBef>
+              <a:spcAft>
+                <a:spcPts val="1000"/>
+              </a:spcAft>
+              <a:buClr>
+                <a:srgbClr val="000000"/>
+              </a:buClr>
+              <a:buSzPts val="1400"/>
+              <a:buFont typeface="Arial" panose="020B0604020202020204"/>
+              <a:buNone/>
+            </a:pPr>
+            <a:r>
+              <a:rPr lang="en-MY" altLang="en-GB" sz="1400" b="0" i="0" u="none" strike="noStrike" cap="none">
+                <a:solidFill>
+                  <a:srgbClr val="222222"/>
+                </a:solidFill>
+                <a:highlight>
+                  <a:srgbClr val="FFFFFF"/>
+                </a:highlight>
+                <a:latin typeface="Lato" panose="020F0502020204030203"/>
+                <a:ea typeface="Lato" panose="020F0502020204030203"/>
+                <a:cs typeface="Lato" panose="020F0502020204030203"/>
+                <a:sym typeface="Lato" panose="020F0502020204030203"/>
+              </a:rPr>
+              <a:t>Azure Cloud Access</a:t>
+            </a:r>
+            <a:endParaRPr lang="en-MY" altLang="en-GB" sz="1400" b="0" i="0" u="none" strike="noStrike" cap="none">
+              <a:solidFill>
+                <a:srgbClr val="222222"/>
+              </a:solidFill>
+              <a:highlight>
+                <a:srgbClr val="FFFFFF"/>
+              </a:highlight>
+              <a:latin typeface="Lato" panose="020F0502020204030203"/>
+              <a:ea typeface="Lato" panose="020F0502020204030203"/>
+              <a:cs typeface="Lato" panose="020F0502020204030203"/>
+              <a:sym typeface="Lato" panose="020F0502020204030203"/>
+            </a:endParaRPr>
+          </a:p>
+          <a:p>
+            <a:pPr marL="0" marR="0" lvl="0" indent="0" algn="l" rtl="0">
+              <a:lnSpc>
+                <a:spcPct val="115000"/>
+              </a:lnSpc>
+              <a:spcBef>
+                <a:spcPts val="1000"/>
+              </a:spcBef>
+              <a:spcAft>
+                <a:spcPts val="1000"/>
+              </a:spcAft>
+              <a:buClr>
+                <a:srgbClr val="000000"/>
+              </a:buClr>
+              <a:buSzPts val="1400"/>
+              <a:buFont typeface="Arial" panose="020B0604020202020204"/>
+              <a:buNone/>
+            </a:pPr>
+            <a:r>
+              <a:rPr lang="en-MY" altLang="en-GB" sz="1400" b="0" i="0" u="none" strike="noStrike" cap="none">
+                <a:solidFill>
+                  <a:srgbClr val="222222"/>
+                </a:solidFill>
+                <a:highlight>
+                  <a:srgbClr val="FFFFFF"/>
+                </a:highlight>
+                <a:latin typeface="Lato" panose="020F0502020204030203"/>
+                <a:ea typeface="Lato" panose="020F0502020204030203"/>
+                <a:cs typeface="Lato" panose="020F0502020204030203"/>
+                <a:sym typeface="Lato" panose="020F0502020204030203"/>
+              </a:rPr>
+              <a:t>Azure Security Framework</a:t>
+            </a:r>
+            <a:endParaRPr lang="en-MY" altLang="en-GB" sz="1400" b="0" i="0" u="none" strike="noStrike" cap="none">
+              <a:solidFill>
+                <a:srgbClr val="222222"/>
+              </a:solidFill>
+              <a:highlight>
+                <a:srgbClr val="FFFFFF"/>
+              </a:highlight>
+              <a:latin typeface="Lato" panose="020F0502020204030203"/>
+              <a:ea typeface="Lato" panose="020F0502020204030203"/>
+              <a:cs typeface="Lato" panose="020F0502020204030203"/>
+              <a:sym typeface="Lato" panose="020F0502020204030203"/>
+            </a:endParaRPr>
+          </a:p>
+          <a:p>
+            <a:pPr marL="0" marR="0" lvl="0" indent="0" algn="l" rtl="0">
+              <a:lnSpc>
+                <a:spcPct val="115000"/>
+              </a:lnSpc>
+              <a:spcBef>
+                <a:spcPts val="1000"/>
+              </a:spcBef>
+              <a:spcAft>
+                <a:spcPts val="1000"/>
+              </a:spcAft>
+              <a:buClr>
+                <a:srgbClr val="000000"/>
+              </a:buClr>
+              <a:buSzPts val="1400"/>
+              <a:buFont typeface="Arial" panose="020B0604020202020204"/>
+              <a:buNone/>
+            </a:pPr>
+            <a:r>
+              <a:rPr lang="en-MY" altLang="en-GB" sz="1400" b="0" i="0" u="none" strike="noStrike" cap="none">
+                <a:solidFill>
+                  <a:srgbClr val="222222"/>
+                </a:solidFill>
+                <a:highlight>
+                  <a:srgbClr val="FFFFFF"/>
+                </a:highlight>
+                <a:latin typeface="Lato" panose="020F0502020204030203"/>
+                <a:ea typeface="Lato" panose="020F0502020204030203"/>
+                <a:cs typeface="Lato" panose="020F0502020204030203"/>
+                <a:sym typeface="Lato" panose="020F0502020204030203"/>
+              </a:rPr>
+              <a:t>Azure AI Development Kit</a:t>
+            </a:r>
+            <a:endParaRPr lang="en-MY" altLang="en-GB" sz="1400" b="0" i="0" u="none" strike="noStrike" cap="none">
+              <a:solidFill>
+                <a:srgbClr val="222222"/>
+              </a:solidFill>
+              <a:highlight>
+                <a:srgbClr val="FFFFFF"/>
+              </a:highlight>
+              <a:latin typeface="Lato" panose="020F0502020204030203"/>
+              <a:ea typeface="Lato" panose="020F0502020204030203"/>
+              <a:cs typeface="Lato" panose="020F0502020204030203"/>
+              <a:sym typeface="Lato" panose="020F0502020204030203"/>
+            </a:endParaRPr>
+          </a:p>
+          <a:p>
+            <a:pPr marL="0" marR="0" lvl="0" indent="0" algn="l" rtl="0">
+              <a:lnSpc>
+                <a:spcPct val="115000"/>
+              </a:lnSpc>
+              <a:spcBef>
+                <a:spcPts val="1000"/>
+              </a:spcBef>
+              <a:spcAft>
+                <a:spcPts val="1000"/>
+              </a:spcAft>
+              <a:buClr>
+                <a:srgbClr val="000000"/>
+              </a:buClr>
+              <a:buSzPts val="1400"/>
+              <a:buFont typeface="Arial" panose="020B0604020202020204"/>
+              <a:buNone/>
+            </a:pPr>
+            <a:r>
+              <a:rPr lang="en-MY" altLang="en-GB" sz="1400" b="0" i="0" u="none" strike="noStrike" cap="none">
+                <a:solidFill>
+                  <a:srgbClr val="222222"/>
+                </a:solidFill>
+                <a:highlight>
+                  <a:srgbClr val="FFFFFF"/>
+                </a:highlight>
+                <a:latin typeface="Lato" panose="020F0502020204030203"/>
+                <a:ea typeface="Lato" panose="020F0502020204030203"/>
+                <a:cs typeface="Lato" panose="020F0502020204030203"/>
+                <a:sym typeface="Lato" panose="020F0502020204030203"/>
+              </a:rPr>
+              <a:t>Green and Sustanibility UI Development framework </a:t>
             </a:r>
             <a:endParaRPr lang="en-MY" altLang="en-GB" sz="1400" b="0" i="0" u="none" strike="noStrike" cap="none">
               <a:solidFill>

</xml_diff>